<commit_message>
three inc and three hier panels
</commit_message>
<xml_diff>
--- a/jsVGL/DrawingResources/ModelBulderPanels.pptx
+++ b/jsVGL/DrawingResources/ModelBulderPanels.pptx
@@ -6,6 +6,7 @@
   </p:sldMasterIdLst>
   <p:sldIdLst>
     <p:sldId id="256" r:id="rId2"/>
+    <p:sldId id="257" r:id="rId3"/>
   </p:sldIdLst>
   <p:sldSz cx="2743200" cy="2743200"/>
   <p:notesSz cx="6858000" cy="9144000"/>
@@ -288,7 +289,7 @@
           <a:p>
             <a:fld id="{CFB226DB-98A3-6945-9BF0-008E8E85CE40}" type="datetimeFigureOut">
               <a:rPr lang="en-US" smtClean="0"/>
-              <a:t>4/10/13</a:t>
+              <a:t>4/15/13</a:t>
             </a:fld>
             <a:endParaRPr lang="en-US"/>
           </a:p>
@@ -458,7 +459,7 @@
           <a:p>
             <a:fld id="{CFB226DB-98A3-6945-9BF0-008E8E85CE40}" type="datetimeFigureOut">
               <a:rPr lang="en-US" smtClean="0"/>
-              <a:t>4/10/13</a:t>
+              <a:t>4/15/13</a:t>
             </a:fld>
             <a:endParaRPr lang="en-US"/>
           </a:p>
@@ -638,7 +639,7 @@
           <a:p>
             <a:fld id="{CFB226DB-98A3-6945-9BF0-008E8E85CE40}" type="datetimeFigureOut">
               <a:rPr lang="en-US" smtClean="0"/>
-              <a:t>4/10/13</a:t>
+              <a:t>4/15/13</a:t>
             </a:fld>
             <a:endParaRPr lang="en-US"/>
           </a:p>
@@ -808,7 +809,7 @@
           <a:p>
             <a:fld id="{CFB226DB-98A3-6945-9BF0-008E8E85CE40}" type="datetimeFigureOut">
               <a:rPr lang="en-US" smtClean="0"/>
-              <a:t>4/10/13</a:t>
+              <a:t>4/15/13</a:t>
             </a:fld>
             <a:endParaRPr lang="en-US"/>
           </a:p>
@@ -1054,7 +1055,7 @@
           <a:p>
             <a:fld id="{CFB226DB-98A3-6945-9BF0-008E8E85CE40}" type="datetimeFigureOut">
               <a:rPr lang="en-US" smtClean="0"/>
-              <a:t>4/10/13</a:t>
+              <a:t>4/15/13</a:t>
             </a:fld>
             <a:endParaRPr lang="en-US"/>
           </a:p>
@@ -1342,7 +1343,7 @@
           <a:p>
             <a:fld id="{CFB226DB-98A3-6945-9BF0-008E8E85CE40}" type="datetimeFigureOut">
               <a:rPr lang="en-US" smtClean="0"/>
-              <a:t>4/10/13</a:t>
+              <a:t>4/15/13</a:t>
             </a:fld>
             <a:endParaRPr lang="en-US"/>
           </a:p>
@@ -1769,7 +1770,7 @@
           <a:p>
             <a:fld id="{CFB226DB-98A3-6945-9BF0-008E8E85CE40}" type="datetimeFigureOut">
               <a:rPr lang="en-US" smtClean="0"/>
-              <a:t>4/10/13</a:t>
+              <a:t>4/15/13</a:t>
             </a:fld>
             <a:endParaRPr lang="en-US"/>
           </a:p>
@@ -1887,7 +1888,7 @@
           <a:p>
             <a:fld id="{CFB226DB-98A3-6945-9BF0-008E8E85CE40}" type="datetimeFigureOut">
               <a:rPr lang="en-US" smtClean="0"/>
-              <a:t>4/10/13</a:t>
+              <a:t>4/15/13</a:t>
             </a:fld>
             <a:endParaRPr lang="en-US"/>
           </a:p>
@@ -1982,7 +1983,7 @@
           <a:p>
             <a:fld id="{CFB226DB-98A3-6945-9BF0-008E8E85CE40}" type="datetimeFigureOut">
               <a:rPr lang="en-US" smtClean="0"/>
-              <a:t>4/10/13</a:t>
+              <a:t>4/15/13</a:t>
             </a:fld>
             <a:endParaRPr lang="en-US"/>
           </a:p>
@@ -2259,7 +2260,7 @@
           <a:p>
             <a:fld id="{CFB226DB-98A3-6945-9BF0-008E8E85CE40}" type="datetimeFigureOut">
               <a:rPr lang="en-US" smtClean="0"/>
-              <a:t>4/10/13</a:t>
+              <a:t>4/15/13</a:t>
             </a:fld>
             <a:endParaRPr lang="en-US"/>
           </a:p>
@@ -2512,7 +2513,7 @@
           <a:p>
             <a:fld id="{CFB226DB-98A3-6945-9BF0-008E8E85CE40}" type="datetimeFigureOut">
               <a:rPr lang="en-US" smtClean="0"/>
-              <a:t>4/10/13</a:t>
+              <a:t>4/15/13</a:t>
             </a:fld>
             <a:endParaRPr lang="en-US"/>
           </a:p>
@@ -2725,7 +2726,7 @@
           <a:p>
             <a:fld id="{CFB226DB-98A3-6945-9BF0-008E8E85CE40}" type="datetimeFigureOut">
               <a:rPr lang="en-US" smtClean="0"/>
-              <a:t>4/10/13</a:t>
+              <a:t>4/15/13</a:t>
             </a:fld>
             <a:endParaRPr lang="en-US"/>
           </a:p>
@@ -3332,6 +3333,808 @@
     <p:extLst>
       <p:ext uri="{BB962C8B-B14F-4D97-AF65-F5344CB8AC3E}">
         <p14:creationId xmlns:p14="http://schemas.microsoft.com/office/powerpoint/2010/main" val="2685323276"/>
+      </p:ext>
+    </p:extLst>
+  </p:cSld>
+  <p:clrMapOvr>
+    <a:masterClrMapping/>
+  </p:clrMapOvr>
+</p:sld>
+</file>
+
+<file path=ppt/slides/slide2.xml><?xml version="1.0" encoding="utf-8"?>
+<p:sld xmlns:a="http://schemas.openxmlformats.org/drawingml/2006/main" xmlns:r="http://schemas.openxmlformats.org/officeDocument/2006/relationships" xmlns:p="http://schemas.openxmlformats.org/presentationml/2006/main">
+  <p:cSld>
+    <p:spTree>
+      <p:nvGrpSpPr>
+        <p:cNvPr id="1" name=""/>
+        <p:cNvGrpSpPr/>
+        <p:nvPr/>
+      </p:nvGrpSpPr>
+      <p:grpSpPr>
+        <a:xfrm>
+          <a:off x="0" y="0"/>
+          <a:ext cx="0" cy="0"/>
+          <a:chOff x="0" y="0"/>
+          <a:chExt cx="0" cy="0"/>
+        </a:xfrm>
+      </p:grpSpPr>
+      <p:sp>
+        <p:nvSpPr>
+          <p:cNvPr id="2" name="Rectangle 1"/>
+          <p:cNvSpPr/>
+          <p:nvPr/>
+        </p:nvSpPr>
+        <p:spPr>
+          <a:xfrm>
+            <a:off x="1266725" y="328576"/>
+            <a:ext cx="45719" cy="54196"/>
+          </a:xfrm>
+          <a:prstGeom prst="rect">
+            <a:avLst/>
+          </a:prstGeom>
+          <a:ln>
+            <a:solidFill>
+              <a:srgbClr val="800000"/>
+            </a:solidFill>
+          </a:ln>
+          <a:effectLst/>
+        </p:spPr>
+        <p:style>
+          <a:lnRef idx="1">
+            <a:schemeClr val="accent1"/>
+          </a:lnRef>
+          <a:fillRef idx="3">
+            <a:schemeClr val="accent1"/>
+          </a:fillRef>
+          <a:effectRef idx="2">
+            <a:schemeClr val="accent1"/>
+          </a:effectRef>
+          <a:fontRef idx="minor">
+            <a:schemeClr val="lt1"/>
+          </a:fontRef>
+        </p:style>
+        <p:txBody>
+          <a:bodyPr rtlCol="0" anchor="ctr"/>
+          <a:lstStyle/>
+          <a:p>
+            <a:pPr algn="ctr"/>
+            <a:endParaRPr lang="en-US"/>
+          </a:p>
+        </p:txBody>
+      </p:sp>
+      <p:sp>
+        <p:nvSpPr>
+          <p:cNvPr id="92" name="Rectangle 91"/>
+          <p:cNvSpPr/>
+          <p:nvPr/>
+        </p:nvSpPr>
+        <p:spPr>
+          <a:xfrm>
+            <a:off x="2251502" y="938176"/>
+            <a:ext cx="45719" cy="54196"/>
+          </a:xfrm>
+          <a:prstGeom prst="rect">
+            <a:avLst/>
+          </a:prstGeom>
+          <a:ln>
+            <a:solidFill>
+              <a:srgbClr val="800000"/>
+            </a:solidFill>
+          </a:ln>
+          <a:effectLst/>
+        </p:spPr>
+        <p:style>
+          <a:lnRef idx="1">
+            <a:schemeClr val="accent1"/>
+          </a:lnRef>
+          <a:fillRef idx="3">
+            <a:schemeClr val="accent1"/>
+          </a:fillRef>
+          <a:effectRef idx="2">
+            <a:schemeClr val="accent1"/>
+          </a:effectRef>
+          <a:fontRef idx="minor">
+            <a:schemeClr val="lt1"/>
+          </a:fontRef>
+        </p:style>
+        <p:txBody>
+          <a:bodyPr rtlCol="0" anchor="ctr"/>
+          <a:lstStyle/>
+          <a:p>
+            <a:pPr algn="ctr"/>
+            <a:endParaRPr lang="en-US"/>
+          </a:p>
+        </p:txBody>
+      </p:sp>
+      <p:sp>
+        <p:nvSpPr>
+          <p:cNvPr id="93" name="Rectangle 92"/>
+          <p:cNvSpPr/>
+          <p:nvPr/>
+        </p:nvSpPr>
+        <p:spPr>
+          <a:xfrm>
+            <a:off x="398906" y="965274"/>
+            <a:ext cx="45719" cy="54196"/>
+          </a:xfrm>
+          <a:prstGeom prst="rect">
+            <a:avLst/>
+          </a:prstGeom>
+          <a:ln>
+            <a:solidFill>
+              <a:srgbClr val="800000"/>
+            </a:solidFill>
+          </a:ln>
+          <a:effectLst/>
+        </p:spPr>
+        <p:style>
+          <a:lnRef idx="1">
+            <a:schemeClr val="accent1"/>
+          </a:lnRef>
+          <a:fillRef idx="3">
+            <a:schemeClr val="accent1"/>
+          </a:fillRef>
+          <a:effectRef idx="2">
+            <a:schemeClr val="accent1"/>
+          </a:effectRef>
+          <a:fontRef idx="minor">
+            <a:schemeClr val="lt1"/>
+          </a:fontRef>
+        </p:style>
+        <p:txBody>
+          <a:bodyPr rtlCol="0" anchor="ctr"/>
+          <a:lstStyle/>
+          <a:p>
+            <a:pPr algn="ctr"/>
+            <a:endParaRPr lang="en-US"/>
+          </a:p>
+        </p:txBody>
+      </p:sp>
+      <p:sp>
+        <p:nvSpPr>
+          <p:cNvPr id="94" name="Rectangle 93"/>
+          <p:cNvSpPr/>
+          <p:nvPr/>
+        </p:nvSpPr>
+        <p:spPr>
+          <a:xfrm>
+            <a:off x="403537" y="1902189"/>
+            <a:ext cx="45719" cy="54196"/>
+          </a:xfrm>
+          <a:prstGeom prst="rect">
+            <a:avLst/>
+          </a:prstGeom>
+          <a:ln>
+            <a:solidFill>
+              <a:srgbClr val="800000"/>
+            </a:solidFill>
+          </a:ln>
+          <a:effectLst/>
+        </p:spPr>
+        <p:style>
+          <a:lnRef idx="1">
+            <a:schemeClr val="accent1"/>
+          </a:lnRef>
+          <a:fillRef idx="3">
+            <a:schemeClr val="accent1"/>
+          </a:fillRef>
+          <a:effectRef idx="2">
+            <a:schemeClr val="accent1"/>
+          </a:effectRef>
+          <a:fontRef idx="minor">
+            <a:schemeClr val="lt1"/>
+          </a:fontRef>
+        </p:style>
+        <p:txBody>
+          <a:bodyPr rtlCol="0" anchor="ctr"/>
+          <a:lstStyle/>
+          <a:p>
+            <a:pPr algn="ctr"/>
+            <a:endParaRPr lang="en-US"/>
+          </a:p>
+        </p:txBody>
+      </p:sp>
+      <p:sp>
+        <p:nvSpPr>
+          <p:cNvPr id="95" name="Rectangle 94"/>
+          <p:cNvSpPr/>
+          <p:nvPr/>
+        </p:nvSpPr>
+        <p:spPr>
+          <a:xfrm>
+            <a:off x="1266725" y="2542173"/>
+            <a:ext cx="45719" cy="54196"/>
+          </a:xfrm>
+          <a:prstGeom prst="rect">
+            <a:avLst/>
+          </a:prstGeom>
+          <a:ln>
+            <a:solidFill>
+              <a:srgbClr val="800000"/>
+            </a:solidFill>
+          </a:ln>
+          <a:effectLst/>
+        </p:spPr>
+        <p:style>
+          <a:lnRef idx="1">
+            <a:schemeClr val="accent1"/>
+          </a:lnRef>
+          <a:fillRef idx="3">
+            <a:schemeClr val="accent1"/>
+          </a:fillRef>
+          <a:effectRef idx="2">
+            <a:schemeClr val="accent1"/>
+          </a:effectRef>
+          <a:fontRef idx="minor">
+            <a:schemeClr val="lt1"/>
+          </a:fontRef>
+        </p:style>
+        <p:txBody>
+          <a:bodyPr rtlCol="0" anchor="ctr"/>
+          <a:lstStyle/>
+          <a:p>
+            <a:pPr algn="ctr"/>
+            <a:endParaRPr lang="en-US"/>
+          </a:p>
+        </p:txBody>
+      </p:sp>
+      <p:sp>
+        <p:nvSpPr>
+          <p:cNvPr id="96" name="Rectangle 95"/>
+          <p:cNvSpPr/>
+          <p:nvPr/>
+        </p:nvSpPr>
+        <p:spPr>
+          <a:xfrm>
+            <a:off x="2251502" y="1914867"/>
+            <a:ext cx="45719" cy="54196"/>
+          </a:xfrm>
+          <a:prstGeom prst="rect">
+            <a:avLst/>
+          </a:prstGeom>
+          <a:ln>
+            <a:solidFill>
+              <a:srgbClr val="800000"/>
+            </a:solidFill>
+          </a:ln>
+          <a:effectLst/>
+        </p:spPr>
+        <p:style>
+          <a:lnRef idx="1">
+            <a:schemeClr val="accent1"/>
+          </a:lnRef>
+          <a:fillRef idx="3">
+            <a:schemeClr val="accent1"/>
+          </a:fillRef>
+          <a:effectRef idx="2">
+            <a:schemeClr val="accent1"/>
+          </a:effectRef>
+          <a:fontRef idx="minor">
+            <a:schemeClr val="lt1"/>
+          </a:fontRef>
+        </p:style>
+        <p:txBody>
+          <a:bodyPr rtlCol="0" anchor="ctr"/>
+          <a:lstStyle/>
+          <a:p>
+            <a:pPr algn="ctr"/>
+            <a:endParaRPr lang="en-US"/>
+          </a:p>
+        </p:txBody>
+      </p:sp>
+      <p:sp>
+        <p:nvSpPr>
+          <p:cNvPr id="5" name="TextBox 4"/>
+          <p:cNvSpPr txBox="1"/>
+          <p:nvPr/>
+        </p:nvSpPr>
+        <p:spPr>
+          <a:xfrm>
+            <a:off x="720043" y="2475"/>
+            <a:ext cx="1151287" cy="276999"/>
+          </a:xfrm>
+          <a:prstGeom prst="rect">
+            <a:avLst/>
+          </a:prstGeom>
+          <a:solidFill>
+            <a:srgbClr val="FFFFFF"/>
+          </a:solidFill>
+          <a:ln>
+            <a:noFill/>
+          </a:ln>
+          <a:effectLst/>
+        </p:spPr>
+        <p:txBody>
+          <a:bodyPr wrap="square" rtlCol="0">
+            <a:spAutoFit/>
+          </a:bodyPr>
+          <a:lstStyle/>
+          <a:p>
+            <a:pPr algn="ctr"/>
+            <a:r>
+              <a:rPr lang="en-US" sz="1200" b="1" dirty="0" smtClean="0">
+                <a:solidFill>
+                  <a:srgbClr val="800000"/>
+                </a:solidFill>
+              </a:rPr>
+              <a:t>Pure Breeding:</a:t>
+            </a:r>
+            <a:endParaRPr lang="en-US" sz="1200" b="1" dirty="0">
+              <a:solidFill>
+                <a:srgbClr val="800000"/>
+              </a:solidFill>
+            </a:endParaRPr>
+          </a:p>
+        </p:txBody>
+      </p:sp>
+      <p:sp>
+        <p:nvSpPr>
+          <p:cNvPr id="8" name="TextBox 7"/>
+          <p:cNvSpPr txBox="1"/>
+          <p:nvPr/>
+        </p:nvSpPr>
+        <p:spPr>
+          <a:xfrm>
+            <a:off x="1598427" y="1367993"/>
+            <a:ext cx="1151287" cy="276999"/>
+          </a:xfrm>
+          <a:prstGeom prst="rect">
+            <a:avLst/>
+          </a:prstGeom>
+          <a:solidFill>
+            <a:srgbClr val="FFFFFF"/>
+          </a:solidFill>
+          <a:ln>
+            <a:noFill/>
+          </a:ln>
+          <a:effectLst/>
+        </p:spPr>
+        <p:txBody>
+          <a:bodyPr wrap="square" rtlCol="0">
+            <a:spAutoFit/>
+          </a:bodyPr>
+          <a:lstStyle/>
+          <a:p>
+            <a:pPr algn="ctr"/>
+            <a:r>
+              <a:rPr lang="en-US" sz="1200" b="1" dirty="0" smtClean="0">
+                <a:solidFill>
+                  <a:srgbClr val="800000"/>
+                </a:solidFill>
+              </a:rPr>
+              <a:t>Pure Breeding:</a:t>
+            </a:r>
+            <a:endParaRPr lang="en-US" sz="1200" b="1" dirty="0">
+              <a:solidFill>
+                <a:srgbClr val="800000"/>
+              </a:solidFill>
+            </a:endParaRPr>
+          </a:p>
+        </p:txBody>
+      </p:sp>
+      <p:sp>
+        <p:nvSpPr>
+          <p:cNvPr id="9" name="TextBox 8"/>
+          <p:cNvSpPr txBox="1"/>
+          <p:nvPr/>
+        </p:nvSpPr>
+        <p:spPr>
+          <a:xfrm>
+            <a:off x="0" y="1367993"/>
+            <a:ext cx="1151287" cy="276999"/>
+          </a:xfrm>
+          <a:prstGeom prst="rect">
+            <a:avLst/>
+          </a:prstGeom>
+          <a:solidFill>
+            <a:srgbClr val="FFFFFF"/>
+          </a:solidFill>
+          <a:ln>
+            <a:noFill/>
+          </a:ln>
+          <a:effectLst/>
+        </p:spPr>
+        <p:txBody>
+          <a:bodyPr wrap="square" rtlCol="0">
+            <a:spAutoFit/>
+          </a:bodyPr>
+          <a:lstStyle/>
+          <a:p>
+            <a:pPr algn="ctr"/>
+            <a:r>
+              <a:rPr lang="en-US" sz="1200" b="1" dirty="0" smtClean="0">
+                <a:solidFill>
+                  <a:srgbClr val="800000"/>
+                </a:solidFill>
+              </a:rPr>
+              <a:t>Pure Breeding:</a:t>
+            </a:r>
+            <a:endParaRPr lang="en-US" sz="1200" b="1" dirty="0">
+              <a:solidFill>
+                <a:srgbClr val="800000"/>
+              </a:solidFill>
+            </a:endParaRPr>
+          </a:p>
+        </p:txBody>
+      </p:sp>
+      <p:sp>
+        <p:nvSpPr>
+          <p:cNvPr id="16" name="TextBox 15"/>
+          <p:cNvSpPr txBox="1"/>
+          <p:nvPr/>
+        </p:nvSpPr>
+        <p:spPr>
+          <a:xfrm>
+            <a:off x="1751832" y="635976"/>
+            <a:ext cx="955857" cy="276999"/>
+          </a:xfrm>
+          <a:prstGeom prst="rect">
+            <a:avLst/>
+          </a:prstGeom>
+          <a:solidFill>
+            <a:srgbClr val="FFFFFF"/>
+          </a:solidFill>
+          <a:ln>
+            <a:noFill/>
+          </a:ln>
+          <a:effectLst/>
+        </p:spPr>
+        <p:txBody>
+          <a:bodyPr wrap="square" rtlCol="0">
+            <a:spAutoFit/>
+          </a:bodyPr>
+          <a:lstStyle/>
+          <a:p>
+            <a:pPr algn="ctr"/>
+            <a:r>
+              <a:rPr lang="en-US" sz="1200" b="1" dirty="0" smtClean="0">
+                <a:solidFill>
+                  <a:srgbClr val="800000"/>
+                </a:solidFill>
+              </a:rPr>
+              <a:t>combined</a:t>
+            </a:r>
+            <a:endParaRPr lang="en-US" sz="1200" b="1" dirty="0">
+              <a:solidFill>
+                <a:srgbClr val="800000"/>
+              </a:solidFill>
+            </a:endParaRPr>
+          </a:p>
+        </p:txBody>
+      </p:sp>
+      <p:sp>
+        <p:nvSpPr>
+          <p:cNvPr id="17" name="TextBox 16"/>
+          <p:cNvSpPr txBox="1"/>
+          <p:nvPr/>
+        </p:nvSpPr>
+        <p:spPr>
+          <a:xfrm>
+            <a:off x="0" y="635976"/>
+            <a:ext cx="955857" cy="276999"/>
+          </a:xfrm>
+          <a:prstGeom prst="rect">
+            <a:avLst/>
+          </a:prstGeom>
+          <a:solidFill>
+            <a:srgbClr val="FFFFFF"/>
+          </a:solidFill>
+          <a:ln>
+            <a:noFill/>
+          </a:ln>
+          <a:effectLst/>
+        </p:spPr>
+        <p:txBody>
+          <a:bodyPr wrap="square" rtlCol="0">
+            <a:spAutoFit/>
+          </a:bodyPr>
+          <a:lstStyle/>
+          <a:p>
+            <a:pPr algn="ctr"/>
+            <a:r>
+              <a:rPr lang="en-US" sz="1200" b="1" dirty="0" smtClean="0">
+                <a:solidFill>
+                  <a:srgbClr val="800000"/>
+                </a:solidFill>
+              </a:rPr>
+              <a:t>combined</a:t>
+            </a:r>
+            <a:endParaRPr lang="en-US" sz="1200" b="1" dirty="0">
+              <a:solidFill>
+                <a:srgbClr val="800000"/>
+              </a:solidFill>
+            </a:endParaRPr>
+          </a:p>
+        </p:txBody>
+      </p:sp>
+      <p:sp>
+        <p:nvSpPr>
+          <p:cNvPr id="18" name="TextBox 17"/>
+          <p:cNvSpPr txBox="1"/>
+          <p:nvPr/>
+        </p:nvSpPr>
+        <p:spPr>
+          <a:xfrm>
+            <a:off x="816201" y="2095164"/>
+            <a:ext cx="955857" cy="276999"/>
+          </a:xfrm>
+          <a:prstGeom prst="rect">
+            <a:avLst/>
+          </a:prstGeom>
+          <a:solidFill>
+            <a:srgbClr val="FFFFFF"/>
+          </a:solidFill>
+          <a:ln>
+            <a:noFill/>
+          </a:ln>
+          <a:effectLst/>
+        </p:spPr>
+        <p:txBody>
+          <a:bodyPr wrap="square" rtlCol="0">
+            <a:spAutoFit/>
+          </a:bodyPr>
+          <a:lstStyle/>
+          <a:p>
+            <a:pPr algn="ctr"/>
+            <a:r>
+              <a:rPr lang="en-US" sz="1200" b="1" dirty="0" smtClean="0">
+                <a:solidFill>
+                  <a:srgbClr val="800000"/>
+                </a:solidFill>
+              </a:rPr>
+              <a:t>combined</a:t>
+            </a:r>
+            <a:endParaRPr lang="en-US" sz="1200" b="1" dirty="0">
+              <a:solidFill>
+                <a:srgbClr val="800000"/>
+              </a:solidFill>
+            </a:endParaRPr>
+          </a:p>
+        </p:txBody>
+      </p:sp>
+      <p:cxnSp>
+        <p:nvCxnSpPr>
+          <p:cNvPr id="139" name="Elbow Connector 138"/>
+          <p:cNvCxnSpPr>
+            <a:stCxn id="8" idx="1"/>
+          </p:cNvCxnSpPr>
+          <p:nvPr/>
+        </p:nvCxnSpPr>
+        <p:spPr>
+          <a:xfrm rot="10800000" flipH="1">
+            <a:off x="1598427" y="912975"/>
+            <a:ext cx="153404" cy="593518"/>
+          </a:xfrm>
+          <a:prstGeom prst="bentConnector4">
+            <a:avLst>
+              <a:gd name="adj1" fmla="val -65845"/>
+              <a:gd name="adj2" fmla="val 100568"/>
+            </a:avLst>
+          </a:prstGeom>
+          <a:ln>
+            <a:solidFill>
+              <a:srgbClr val="800000"/>
+            </a:solidFill>
+            <a:tailEnd type="arrow"/>
+          </a:ln>
+          <a:effectLst/>
+        </p:spPr>
+        <p:style>
+          <a:lnRef idx="2">
+            <a:schemeClr val="accent1"/>
+          </a:lnRef>
+          <a:fillRef idx="0">
+            <a:schemeClr val="accent1"/>
+          </a:fillRef>
+          <a:effectRef idx="1">
+            <a:schemeClr val="accent1"/>
+          </a:effectRef>
+          <a:fontRef idx="minor">
+            <a:schemeClr val="tx1"/>
+          </a:fontRef>
+        </p:style>
+      </p:cxnSp>
+      <p:cxnSp>
+        <p:nvCxnSpPr>
+          <p:cNvPr id="149" name="Elbow Connector 148"/>
+          <p:cNvCxnSpPr/>
+          <p:nvPr/>
+        </p:nvCxnSpPr>
+        <p:spPr>
+          <a:xfrm rot="10800000">
+            <a:off x="955857" y="912976"/>
+            <a:ext cx="153404" cy="593518"/>
+          </a:xfrm>
+          <a:prstGeom prst="bentConnector4">
+            <a:avLst>
+              <a:gd name="adj1" fmla="val -65845"/>
+              <a:gd name="adj2" fmla="val 100568"/>
+            </a:avLst>
+          </a:prstGeom>
+          <a:ln>
+            <a:solidFill>
+              <a:srgbClr val="800000"/>
+            </a:solidFill>
+            <a:tailEnd type="arrow"/>
+          </a:ln>
+          <a:effectLst/>
+        </p:spPr>
+        <p:style>
+          <a:lnRef idx="2">
+            <a:schemeClr val="accent1"/>
+          </a:lnRef>
+          <a:fillRef idx="0">
+            <a:schemeClr val="accent1"/>
+          </a:fillRef>
+          <a:effectRef idx="1">
+            <a:schemeClr val="accent1"/>
+          </a:effectRef>
+          <a:fontRef idx="minor">
+            <a:schemeClr val="tx1"/>
+          </a:fontRef>
+        </p:style>
+      </p:cxnSp>
+      <p:cxnSp>
+        <p:nvCxnSpPr>
+          <p:cNvPr id="150" name="Elbow Connector 149"/>
+          <p:cNvCxnSpPr/>
+          <p:nvPr/>
+        </p:nvCxnSpPr>
+        <p:spPr>
+          <a:xfrm rot="16200000" flipH="1">
+            <a:off x="1358831" y="498265"/>
+            <a:ext cx="437668" cy="348334"/>
+          </a:xfrm>
+          <a:prstGeom prst="bentConnector3">
+            <a:avLst>
+              <a:gd name="adj1" fmla="val 54165"/>
+            </a:avLst>
+          </a:prstGeom>
+          <a:ln>
+            <a:solidFill>
+              <a:srgbClr val="800000"/>
+            </a:solidFill>
+            <a:tailEnd type="arrow"/>
+          </a:ln>
+          <a:effectLst/>
+        </p:spPr>
+        <p:style>
+          <a:lnRef idx="2">
+            <a:schemeClr val="accent1"/>
+          </a:lnRef>
+          <a:fillRef idx="0">
+            <a:schemeClr val="accent1"/>
+          </a:fillRef>
+          <a:effectRef idx="1">
+            <a:schemeClr val="accent1"/>
+          </a:effectRef>
+          <a:fontRef idx="minor">
+            <a:schemeClr val="tx1"/>
+          </a:fontRef>
+        </p:style>
+      </p:cxnSp>
+      <p:cxnSp>
+        <p:nvCxnSpPr>
+          <p:cNvPr id="154" name="Elbow Connector 153"/>
+          <p:cNvCxnSpPr/>
+          <p:nvPr/>
+        </p:nvCxnSpPr>
+        <p:spPr>
+          <a:xfrm rot="5400000">
+            <a:off x="919443" y="498265"/>
+            <a:ext cx="437668" cy="348334"/>
+          </a:xfrm>
+          <a:prstGeom prst="bentConnector3">
+            <a:avLst>
+              <a:gd name="adj1" fmla="val 54165"/>
+            </a:avLst>
+          </a:prstGeom>
+          <a:ln>
+            <a:solidFill>
+              <a:srgbClr val="800000"/>
+            </a:solidFill>
+            <a:tailEnd type="arrow"/>
+          </a:ln>
+          <a:effectLst/>
+        </p:spPr>
+        <p:style>
+          <a:lnRef idx="2">
+            <a:schemeClr val="accent1"/>
+          </a:lnRef>
+          <a:fillRef idx="0">
+            <a:schemeClr val="accent1"/>
+          </a:fillRef>
+          <a:effectRef idx="1">
+            <a:schemeClr val="accent1"/>
+          </a:effectRef>
+          <a:fontRef idx="minor">
+            <a:schemeClr val="tx1"/>
+          </a:fontRef>
+        </p:style>
+      </p:cxnSp>
+      <p:cxnSp>
+        <p:nvCxnSpPr>
+          <p:cNvPr id="155" name="Elbow Connector 154"/>
+          <p:cNvCxnSpPr/>
+          <p:nvPr/>
+        </p:nvCxnSpPr>
+        <p:spPr>
+          <a:xfrm>
+            <a:off x="887059" y="1902189"/>
+            <a:ext cx="396369" cy="273030"/>
+          </a:xfrm>
+          <a:prstGeom prst="bentConnector3">
+            <a:avLst>
+              <a:gd name="adj1" fmla="val 97518"/>
+            </a:avLst>
+          </a:prstGeom>
+          <a:ln>
+            <a:solidFill>
+              <a:srgbClr val="800000"/>
+            </a:solidFill>
+            <a:tailEnd type="arrow"/>
+          </a:ln>
+          <a:effectLst/>
+        </p:spPr>
+        <p:style>
+          <a:lnRef idx="2">
+            <a:schemeClr val="accent1"/>
+          </a:lnRef>
+          <a:fillRef idx="0">
+            <a:schemeClr val="accent1"/>
+          </a:fillRef>
+          <a:effectRef idx="1">
+            <a:schemeClr val="accent1"/>
+          </a:effectRef>
+          <a:fontRef idx="minor">
+            <a:schemeClr val="tx1"/>
+          </a:fontRef>
+        </p:style>
+      </p:cxnSp>
+      <p:cxnSp>
+        <p:nvCxnSpPr>
+          <p:cNvPr id="159" name="Elbow Connector 158"/>
+          <p:cNvCxnSpPr/>
+          <p:nvPr/>
+        </p:nvCxnSpPr>
+        <p:spPr>
+          <a:xfrm flipH="1">
+            <a:off x="1355462" y="1902189"/>
+            <a:ext cx="396369" cy="273030"/>
+          </a:xfrm>
+          <a:prstGeom prst="bentConnector3">
+            <a:avLst>
+              <a:gd name="adj1" fmla="val 97518"/>
+            </a:avLst>
+          </a:prstGeom>
+          <a:ln>
+            <a:solidFill>
+              <a:srgbClr val="800000"/>
+            </a:solidFill>
+            <a:tailEnd type="arrow"/>
+          </a:ln>
+          <a:effectLst/>
+        </p:spPr>
+        <p:style>
+          <a:lnRef idx="2">
+            <a:schemeClr val="accent1"/>
+          </a:lnRef>
+          <a:fillRef idx="0">
+            <a:schemeClr val="accent1"/>
+          </a:fillRef>
+          <a:effectRef idx="1">
+            <a:schemeClr val="accent1"/>
+          </a:effectRef>
+          <a:fontRef idx="minor">
+            <a:schemeClr val="tx1"/>
+          </a:fontRef>
+        </p:style>
+      </p:cxnSp>
+    </p:spTree>
+    <p:extLst>
+      <p:ext uri="{BB962C8B-B14F-4D97-AF65-F5344CB8AC3E}">
+        <p14:creationId xmlns:p14="http://schemas.microsoft.com/office/powerpoint/2010/main" val="630339145"/>
       </p:ext>
     </p:extLst>
   </p:cSld>

</xml_diff>

<commit_message>
finished layouts for MBUI panels
</commit_message>
<xml_diff>
--- a/jsVGL/DrawingResources/ModelBulderPanels.pptx
+++ b/jsVGL/DrawingResources/ModelBulderPanels.pptx
@@ -7,6 +7,7 @@
   <p:sldIdLst>
     <p:sldId id="256" r:id="rId2"/>
     <p:sldId id="257" r:id="rId3"/>
+    <p:sldId id="258" r:id="rId4"/>
   </p:sldIdLst>
   <p:sldSz cx="2743200" cy="2743200"/>
   <p:notesSz cx="6858000" cy="9144000"/>
@@ -4135,6 +4136,200 @@
     <p:extLst>
       <p:ext uri="{BB962C8B-B14F-4D97-AF65-F5344CB8AC3E}">
         <p14:creationId xmlns:p14="http://schemas.microsoft.com/office/powerpoint/2010/main" val="630339145"/>
+      </p:ext>
+    </p:extLst>
+  </p:cSld>
+  <p:clrMapOvr>
+    <a:masterClrMapping/>
+  </p:clrMapOvr>
+</p:sld>
+</file>
+
+<file path=ppt/slides/slide3.xml><?xml version="1.0" encoding="utf-8"?>
+<p:sld xmlns:a="http://schemas.openxmlformats.org/drawingml/2006/main" xmlns:r="http://schemas.openxmlformats.org/officeDocument/2006/relationships" xmlns:p="http://schemas.openxmlformats.org/presentationml/2006/main">
+  <p:cSld>
+    <p:spTree>
+      <p:nvGrpSpPr>
+        <p:cNvPr id="1" name=""/>
+        <p:cNvGrpSpPr/>
+        <p:nvPr/>
+      </p:nvGrpSpPr>
+      <p:grpSpPr>
+        <a:xfrm>
+          <a:off x="0" y="0"/>
+          <a:ext cx="0" cy="0"/>
+          <a:chOff x="0" y="0"/>
+          <a:chExt cx="0" cy="0"/>
+        </a:xfrm>
+      </p:grpSpPr>
+      <p:sp>
+        <p:nvSpPr>
+          <p:cNvPr id="5" name="TextBox 4"/>
+          <p:cNvSpPr txBox="1"/>
+          <p:nvPr/>
+        </p:nvSpPr>
+        <p:spPr>
+          <a:xfrm>
+            <a:off x="908392" y="452083"/>
+            <a:ext cx="1151287" cy="276999"/>
+          </a:xfrm>
+          <a:prstGeom prst="rect">
+            <a:avLst/>
+          </a:prstGeom>
+          <a:solidFill>
+            <a:srgbClr val="FFFFFF"/>
+          </a:solidFill>
+          <a:ln>
+            <a:noFill/>
+          </a:ln>
+          <a:effectLst/>
+        </p:spPr>
+        <p:txBody>
+          <a:bodyPr wrap="square" rtlCol="0">
+            <a:spAutoFit/>
+          </a:bodyPr>
+          <a:lstStyle/>
+          <a:p>
+            <a:pPr algn="ctr"/>
+            <a:r>
+              <a:rPr lang="en-US" sz="1200" b="1" dirty="0" smtClean="0">
+                <a:solidFill>
+                  <a:srgbClr val="800000"/>
+                </a:solidFill>
+              </a:rPr>
+              <a:t>Gene A</a:t>
+            </a:r>
+            <a:endParaRPr lang="en-US" sz="1200" b="1" dirty="0">
+              <a:solidFill>
+                <a:srgbClr val="800000"/>
+              </a:solidFill>
+            </a:endParaRPr>
+          </a:p>
+        </p:txBody>
+      </p:sp>
+      <p:sp>
+        <p:nvSpPr>
+          <p:cNvPr id="20" name="TextBox 19"/>
+          <p:cNvSpPr txBox="1"/>
+          <p:nvPr/>
+        </p:nvSpPr>
+        <p:spPr>
+          <a:xfrm>
+            <a:off x="908392" y="1714395"/>
+            <a:ext cx="1151287" cy="276999"/>
+          </a:xfrm>
+          <a:prstGeom prst="rect">
+            <a:avLst/>
+          </a:prstGeom>
+          <a:solidFill>
+            <a:srgbClr val="FFFFFF"/>
+          </a:solidFill>
+          <a:ln>
+            <a:noFill/>
+          </a:ln>
+          <a:effectLst/>
+        </p:spPr>
+        <p:txBody>
+          <a:bodyPr wrap="square" rtlCol="0">
+            <a:spAutoFit/>
+          </a:bodyPr>
+          <a:lstStyle/>
+          <a:p>
+            <a:pPr algn="ctr"/>
+            <a:r>
+              <a:rPr lang="en-US" sz="1200" b="1" dirty="0" smtClean="0">
+                <a:solidFill>
+                  <a:srgbClr val="800000"/>
+                </a:solidFill>
+              </a:rPr>
+              <a:t>Gene B</a:t>
+            </a:r>
+            <a:endParaRPr lang="en-US" sz="1200" b="1" dirty="0">
+              <a:solidFill>
+                <a:srgbClr val="800000"/>
+              </a:solidFill>
+            </a:endParaRPr>
+          </a:p>
+        </p:txBody>
+      </p:sp>
+      <p:cxnSp>
+        <p:nvCxnSpPr>
+          <p:cNvPr id="21" name="Straight Arrow Connector 20"/>
+          <p:cNvCxnSpPr/>
+          <p:nvPr/>
+        </p:nvCxnSpPr>
+        <p:spPr>
+          <a:xfrm>
+            <a:off x="1160342" y="452083"/>
+            <a:ext cx="0" cy="392448"/>
+          </a:xfrm>
+          <a:prstGeom prst="straightConnector1">
+            <a:avLst/>
+          </a:prstGeom>
+          <a:ln>
+            <a:solidFill>
+              <a:srgbClr val="800000"/>
+            </a:solidFill>
+            <a:tailEnd type="arrow"/>
+          </a:ln>
+          <a:effectLst/>
+        </p:spPr>
+        <p:style>
+          <a:lnRef idx="2">
+            <a:schemeClr val="accent1"/>
+          </a:lnRef>
+          <a:fillRef idx="0">
+            <a:schemeClr val="accent1"/>
+          </a:fillRef>
+          <a:effectRef idx="1">
+            <a:schemeClr val="accent1"/>
+          </a:effectRef>
+          <a:fontRef idx="minor">
+            <a:schemeClr val="tx1"/>
+          </a:fontRef>
+        </p:style>
+      </p:cxnSp>
+      <p:cxnSp>
+        <p:nvCxnSpPr>
+          <p:cNvPr id="23" name="Straight Arrow Connector 22"/>
+          <p:cNvCxnSpPr/>
+          <p:nvPr/>
+        </p:nvCxnSpPr>
+        <p:spPr>
+          <a:xfrm>
+            <a:off x="1160342" y="1690740"/>
+            <a:ext cx="0" cy="392448"/>
+          </a:xfrm>
+          <a:prstGeom prst="straightConnector1">
+            <a:avLst/>
+          </a:prstGeom>
+          <a:ln>
+            <a:solidFill>
+              <a:srgbClr val="800000"/>
+            </a:solidFill>
+            <a:tailEnd type="arrow"/>
+          </a:ln>
+          <a:effectLst/>
+        </p:spPr>
+        <p:style>
+          <a:lnRef idx="2">
+            <a:schemeClr val="accent1"/>
+          </a:lnRef>
+          <a:fillRef idx="0">
+            <a:schemeClr val="accent1"/>
+          </a:fillRef>
+          <a:effectRef idx="1">
+            <a:schemeClr val="accent1"/>
+          </a:effectRef>
+          <a:fontRef idx="minor">
+            <a:schemeClr val="tx1"/>
+          </a:fontRef>
+        </p:style>
+      </p:cxnSp>
+    </p:spTree>
+    <p:extLst>
+      <p:ext uri="{BB962C8B-B14F-4D97-AF65-F5344CB8AC3E}">
+        <p14:creationId xmlns:p14="http://schemas.microsoft.com/office/powerpoint/2010/main" val="4274868812"/>
       </p:ext>
     </p:extLst>
   </p:cSld>

</xml_diff>